<commit_message>
Fixed leveraged TTP to observed TTP
</commit_message>
<xml_diff>
--- a/idioms/threat-actor/leveraged-ttp/diagram.pptx
+++ b/idioms/threat-actor/leveraged-ttp/diagram.pptx
@@ -288,7 +288,7 @@
           <a:p>
             <a:fld id="{13F24B86-36D2-4655-BE2F-98B661AC85E1}" type="datetimeFigureOut">
               <a:rPr lang="en-US" smtClean="0"/>
-              <a:t>3/25/2014</a:t>
+              <a:t>3/27/2014</a:t>
             </a:fld>
             <a:endParaRPr lang="en-US"/>
           </a:p>
@@ -458,7 +458,7 @@
           <a:p>
             <a:fld id="{13F24B86-36D2-4655-BE2F-98B661AC85E1}" type="datetimeFigureOut">
               <a:rPr lang="en-US" smtClean="0"/>
-              <a:t>3/25/2014</a:t>
+              <a:t>3/27/2014</a:t>
             </a:fld>
             <a:endParaRPr lang="en-US"/>
           </a:p>
@@ -638,7 +638,7 @@
           <a:p>
             <a:fld id="{13F24B86-36D2-4655-BE2F-98B661AC85E1}" type="datetimeFigureOut">
               <a:rPr lang="en-US" smtClean="0"/>
-              <a:t>3/25/2014</a:t>
+              <a:t>3/27/2014</a:t>
             </a:fld>
             <a:endParaRPr lang="en-US"/>
           </a:p>
@@ -808,7 +808,7 @@
           <a:p>
             <a:fld id="{13F24B86-36D2-4655-BE2F-98B661AC85E1}" type="datetimeFigureOut">
               <a:rPr lang="en-US" smtClean="0"/>
-              <a:t>3/25/2014</a:t>
+              <a:t>3/27/2014</a:t>
             </a:fld>
             <a:endParaRPr lang="en-US"/>
           </a:p>
@@ -1054,7 +1054,7 @@
           <a:p>
             <a:fld id="{13F24B86-36D2-4655-BE2F-98B661AC85E1}" type="datetimeFigureOut">
               <a:rPr lang="en-US" smtClean="0"/>
-              <a:t>3/25/2014</a:t>
+              <a:t>3/27/2014</a:t>
             </a:fld>
             <a:endParaRPr lang="en-US"/>
           </a:p>
@@ -1342,7 +1342,7 @@
           <a:p>
             <a:fld id="{13F24B86-36D2-4655-BE2F-98B661AC85E1}" type="datetimeFigureOut">
               <a:rPr lang="en-US" smtClean="0"/>
-              <a:t>3/25/2014</a:t>
+              <a:t>3/27/2014</a:t>
             </a:fld>
             <a:endParaRPr lang="en-US"/>
           </a:p>
@@ -1764,7 +1764,7 @@
           <a:p>
             <a:fld id="{13F24B86-36D2-4655-BE2F-98B661AC85E1}" type="datetimeFigureOut">
               <a:rPr lang="en-US" smtClean="0"/>
-              <a:t>3/25/2014</a:t>
+              <a:t>3/27/2014</a:t>
             </a:fld>
             <a:endParaRPr lang="en-US"/>
           </a:p>
@@ -1882,7 +1882,7 @@
           <a:p>
             <a:fld id="{13F24B86-36D2-4655-BE2F-98B661AC85E1}" type="datetimeFigureOut">
               <a:rPr lang="en-US" smtClean="0"/>
-              <a:t>3/25/2014</a:t>
+              <a:t>3/27/2014</a:t>
             </a:fld>
             <a:endParaRPr lang="en-US"/>
           </a:p>
@@ -1977,7 +1977,7 @@
           <a:p>
             <a:fld id="{13F24B86-36D2-4655-BE2F-98B661AC85E1}" type="datetimeFigureOut">
               <a:rPr lang="en-US" smtClean="0"/>
-              <a:t>3/25/2014</a:t>
+              <a:t>3/27/2014</a:t>
             </a:fld>
             <a:endParaRPr lang="en-US"/>
           </a:p>
@@ -2254,7 +2254,7 @@
           <a:p>
             <a:fld id="{13F24B86-36D2-4655-BE2F-98B661AC85E1}" type="datetimeFigureOut">
               <a:rPr lang="en-US" smtClean="0"/>
-              <a:t>3/25/2014</a:t>
+              <a:t>3/27/2014</a:t>
             </a:fld>
             <a:endParaRPr lang="en-US"/>
           </a:p>
@@ -2507,7 +2507,7 @@
           <a:p>
             <a:fld id="{13F24B86-36D2-4655-BE2F-98B661AC85E1}" type="datetimeFigureOut">
               <a:rPr lang="en-US" smtClean="0"/>
-              <a:t>3/25/2014</a:t>
+              <a:t>3/27/2014</a:t>
             </a:fld>
             <a:endParaRPr lang="en-US"/>
           </a:p>
@@ -2720,7 +2720,7 @@
           <a:p>
             <a:fld id="{13F24B86-36D2-4655-BE2F-98B661AC85E1}" type="datetimeFigureOut">
               <a:rPr lang="en-US" smtClean="0"/>
-              <a:t>3/25/2014</a:t>
+              <a:t>3/27/2014</a:t>
             </a:fld>
             <a:endParaRPr lang="en-US"/>
           </a:p>
@@ -3104,14 +3104,14 @@
           <p:nvPr>
             <p:extLst>
               <p:ext uri="{D42A27DB-BD31-4B8C-83A1-F6EECF244321}">
-                <p14:modId xmlns:p14="http://schemas.microsoft.com/office/powerpoint/2010/main" val="974966672"/>
+                <p14:modId xmlns:p14="http://schemas.microsoft.com/office/powerpoint/2010/main" val="2252262906"/>
               </p:ext>
             </p:extLst>
           </p:nvPr>
         </p:nvGraphicFramePr>
         <p:xfrm>
           <a:off x="107407" y="2103082"/>
-          <a:ext cx="4912268" cy="3352800"/>
+          <a:ext cx="4912268" cy="3611880"/>
         </p:xfrm>
         <a:graphic>
           <a:graphicData uri="http://schemas.openxmlformats.org/drawingml/2006/table">
@@ -3276,7 +3276,6 @@
                         <a:rPr lang="en-US" sz="1100" dirty="0" smtClean="0"/>
                         <a:t>example:threatactor-9a8a0d25-7636-429b-a99e-b2a73cd0f11f</a:t>
                       </a:r>
-                      <a:endParaRPr lang="en-US" sz="1100" dirty="0" smtClean="0"/>
                     </a:p>
                   </a:txBody>
                   <a:tcPr>
@@ -3361,7 +3360,6 @@
                         <a:rPr lang="en-US" sz="1100" dirty="0" smtClean="0"/>
                         <a:t>Adversary Bravo</a:t>
                       </a:r>
-                      <a:endParaRPr lang="en-US" sz="1100" dirty="0" smtClean="0"/>
                     </a:p>
                   </a:txBody>
                   <a:tcPr>
@@ -3546,11 +3544,7 @@
                     <a:p>
                       <a:r>
                         <a:rPr lang="en-US" sz="1100" dirty="0" smtClean="0"/>
-                        <a:t>    </a:t>
-                      </a:r>
-                      <a:r>
-                        <a:rPr lang="en-US" sz="1100" dirty="0" smtClean="0"/>
-                        <a:t>Name</a:t>
+                        <a:t>    Name</a:t>
                       </a:r>
                       <a:endParaRPr lang="en-US" sz="1100" b="0" dirty="0"/>
                     </a:p>
@@ -3585,7 +3579,6 @@
                         <a:rPr lang="en-US" sz="1100" b="0" dirty="0" smtClean="0"/>
                         <a:t>Adversary Bravo</a:t>
                       </a:r>
-                      <a:endParaRPr lang="en-US" sz="1100" b="0" dirty="0" smtClean="0"/>
                     </a:p>
                   </a:txBody>
                   <a:tcPr>
@@ -3650,7 +3643,7 @@
                     <a:p>
                       <a:r>
                         <a:rPr lang="en-US" sz="1100" b="0" dirty="0" smtClean="0"/>
-                        <a:t>Leveraged TTPs</a:t>
+                        <a:t>Observed TTP</a:t>
                       </a:r>
                       <a:endParaRPr lang="en-US" sz="1100" b="0" dirty="0"/>
                     </a:p>
@@ -4133,7 +4126,6 @@
                         <a:rPr lang="en-US" sz="1100" b="0" dirty="0" smtClean="0"/>
                         <a:t>Leverages Attack Pattern</a:t>
                       </a:r>
-                      <a:endParaRPr lang="en-US" sz="1100" b="0" dirty="0" smtClean="0"/>
                     </a:p>
                   </a:txBody>
                   <a:tcPr>
@@ -4234,6 +4226,102 @@
                       <a:prstDash val="solid"/>
                     </a:lnBlToTr>
                   </a:tcPr>
+                </a:tc>
+              </a:tr>
+              <a:tr h="144405">
+                <a:tc>
+                  <a:txBody>
+                    <a:bodyPr/>
+                    <a:lstStyle/>
+                    <a:p>
+                      <a:r>
+                        <a:rPr lang="en-US" sz="1100" b="0" dirty="0" smtClean="0"/>
+                        <a:t>Observed TTP</a:t>
+                      </a:r>
+                      <a:endParaRPr lang="en-US" sz="1100" b="0" dirty="0"/>
+                    </a:p>
+                  </a:txBody>
+                  <a:tcPr>
+                    <a:lnL w="12700" cap="flat" cmpd="sng" algn="ctr">
+                      <a:solidFill>
+                        <a:schemeClr val="tx1"/>
+                      </a:solidFill>
+                      <a:prstDash val="solid"/>
+                      <a:round/>
+                      <a:headEnd type="none" w="med" len="med"/>
+                      <a:tailEnd type="none" w="med" len="med"/>
+                    </a:lnL>
+                    <a:lnR w="12700" cap="flat" cmpd="sng" algn="ctr">
+                      <a:solidFill>
+                        <a:schemeClr val="tx1"/>
+                      </a:solidFill>
+                      <a:prstDash val="solid"/>
+                      <a:round/>
+                      <a:headEnd type="none" w="med" len="med"/>
+                      <a:tailEnd type="none" w="med" len="med"/>
+                    </a:lnR>
+                  </a:tcPr>
+                </a:tc>
+                <a:tc gridSpan="2">
+                  <a:txBody>
+                    <a:bodyPr/>
+                    <a:lstStyle/>
+                    <a:p>
+                      <a:endParaRPr lang="en-US" sz="1100" b="0" dirty="0" smtClean="0"/>
+                    </a:p>
+                  </a:txBody>
+                  <a:tcPr>
+                    <a:lnL w="12700" cap="flat" cmpd="sng" algn="ctr">
+                      <a:solidFill>
+                        <a:schemeClr val="tx1"/>
+                      </a:solidFill>
+                      <a:prstDash val="solid"/>
+                      <a:round/>
+                      <a:headEnd type="none" w="med" len="med"/>
+                      <a:tailEnd type="none" w="med" len="med"/>
+                    </a:lnL>
+                    <a:lnR w="12700" cap="flat" cmpd="sng" algn="ctr">
+                      <a:solidFill>
+                        <a:schemeClr val="tx1"/>
+                      </a:solidFill>
+                      <a:prstDash val="solid"/>
+                      <a:round/>
+                      <a:headEnd type="none" w="med" len="med"/>
+                      <a:tailEnd type="none" w="med" len="med"/>
+                    </a:lnR>
+                    <a:lnT w="12700" cap="flat" cmpd="sng" algn="ctr">
+                      <a:noFill/>
+                      <a:prstDash val="solid"/>
+                      <a:round/>
+                      <a:headEnd type="none" w="med" len="med"/>
+                      <a:tailEnd type="none" w="med" len="med"/>
+                    </a:lnT>
+                    <a:lnB w="12700" cap="flat" cmpd="sng" algn="ctr">
+                      <a:noFill/>
+                      <a:prstDash val="solid"/>
+                      <a:round/>
+                      <a:headEnd type="none" w="med" len="med"/>
+                      <a:tailEnd type="none" w="med" len="med"/>
+                    </a:lnB>
+                    <a:lnTlToBr w="12700" cmpd="sng">
+                      <a:noFill/>
+                      <a:prstDash val="solid"/>
+                    </a:lnTlToBr>
+                    <a:lnBlToTr w="12700" cmpd="sng">
+                      <a:noFill/>
+                      <a:prstDash val="solid"/>
+                    </a:lnBlToTr>
+                  </a:tcPr>
+                </a:tc>
+                <a:tc hMerge="1">
+                  <a:txBody>
+                    <a:bodyPr/>
+                    <a:lstStyle/>
+                    <a:p>
+                      <a:endParaRPr lang="en-US"/>
+                    </a:p>
+                  </a:txBody>
+                  <a:tcPr/>
                 </a:tc>
               </a:tr>
               <a:tr h="144405">
@@ -4396,7 +4484,6 @@
                         <a:rPr lang="en-US" sz="1100" b="0" dirty="0" smtClean="0"/>
                         <a:t>example:ttp-d1c612bc-146f-4b65-b7b0-9a54a14150a4</a:t>
                       </a:r>
-                      <a:endParaRPr lang="en-US" sz="1100" b="0" dirty="0" smtClean="0"/>
                     </a:p>
                   </a:txBody>
                   <a:tcPr>
@@ -4505,7 +4592,6 @@
                         <a:rPr lang="en-US" sz="1100" b="0" dirty="0" smtClean="0"/>
                         <a:t>Leverages Malware</a:t>
                       </a:r>
-                      <a:endParaRPr lang="en-US" sz="1100" b="0" dirty="0" smtClean="0"/>
                     </a:p>
                   </a:txBody>
                   <a:tcPr>
@@ -4755,7 +4841,6 @@
                         <a:rPr lang="en-US" sz="1100" b="0" dirty="0" smtClean="0"/>
                         <a:t>example:ttp-8ac90ff3-ecf8-4835-95b8-6aea6a623df5</a:t>
                       </a:r>
-                      <a:endParaRPr lang="en-US" sz="1100" b="0" dirty="0" smtClean="0"/>
                     </a:p>
                   </a:txBody>
                   <a:tcPr>
@@ -4830,7 +4915,6 @@
                         <a:rPr lang="en-US" sz="1100" dirty="0" smtClean="0"/>
                         <a:t>Adversary Bravo Phishing</a:t>
                       </a:r>
-                      <a:endParaRPr lang="en-US" sz="1100" dirty="0" smtClean="0"/>
                     </a:p>
                   </a:txBody>
                   <a:tcPr>
@@ -5096,11 +5180,6 @@
                         </a:rPr>
                         <a:t>CAPEC-98</a:t>
                       </a:r>
-                      <a:endParaRPr lang="en-US" sz="1100" b="0" dirty="0" smtClean="0">
-                        <a:solidFill>
-                          <a:schemeClr val="tx1"/>
-                        </a:solidFill>
-                      </a:endParaRPr>
                     </a:p>
                   </a:txBody>
                   <a:tcPr>
@@ -5466,7 +5545,6 @@
                         <a:rPr lang="en-US" sz="1100" b="0" dirty="0" smtClean="0"/>
                         <a:t>example:ttp-d1c612bc-146f-4b65-b7b0-9a54a14150a4</a:t>
                       </a:r>
-                      <a:endParaRPr lang="en-US" sz="1100" b="0" dirty="0" smtClean="0"/>
                     </a:p>
                   </a:txBody>
                   <a:tcPr>
@@ -5551,7 +5629,6 @@
                         <a:rPr lang="en-US" sz="1100" dirty="0" smtClean="0"/>
                         <a:t>Adversary Bravo PIVY Instance</a:t>
                       </a:r>
-                      <a:endParaRPr lang="en-US" sz="1100" dirty="0" smtClean="0"/>
                     </a:p>
                   </a:txBody>
                   <a:tcPr>
@@ -5853,21 +5930,8 @@
                             <a:schemeClr val="tx1"/>
                           </a:solidFill>
                         </a:rPr>
-                        <a:t>Poison </a:t>
+                        <a:t>Poison Ivy Variant d1c6</a:t>
                       </a:r>
-                      <a:r>
-                        <a:rPr lang="en-US" sz="1100" b="0" dirty="0" smtClean="0">
-                          <a:solidFill>
-                            <a:schemeClr val="tx1"/>
-                          </a:solidFill>
-                        </a:rPr>
-                        <a:t>Ivy Variant d1c6</a:t>
-                      </a:r>
-                      <a:endParaRPr lang="en-US" sz="1100" b="0" dirty="0" smtClean="0">
-                        <a:solidFill>
-                          <a:schemeClr val="tx1"/>
-                        </a:solidFill>
-                      </a:endParaRPr>
                     </a:p>
                   </a:txBody>
                   <a:tcPr>
@@ -6236,8 +6300,8 @@
         </p:nvCxnSpPr>
         <p:spPr>
           <a:xfrm>
-            <a:off x="4552950" y="5076825"/>
-            <a:ext cx="971550" cy="0"/>
+            <a:off x="4533900" y="5334000"/>
+            <a:ext cx="990600" cy="0"/>
           </a:xfrm>
           <a:prstGeom prst="line">
             <a:avLst/>
@@ -6273,7 +6337,7 @@
         <p:spPr>
           <a:xfrm>
             <a:off x="5524500" y="4695825"/>
-            <a:ext cx="0" cy="381000"/>
+            <a:ext cx="0" cy="638175"/>
           </a:xfrm>
           <a:prstGeom prst="line">
             <a:avLst/>

</xml_diff>

<commit_message>
Modified the content (Titles and Description) of the TTPs so as to unbind them from the ThreatActor. The point of abstracting the TTPs is so they are NOT tightly bound to any given TA and can be used for pivoting.
A few other corrections and language tweaks.
</commit_message>
<xml_diff>
--- a/idioms/threat-actor/leveraged-ttp/diagram.pptx
+++ b/idioms/threat-actor/leveraged-ttp/diagram.pptx
@@ -288,7 +288,7 @@
           <a:p>
             <a:fld id="{13F24B86-36D2-4655-BE2F-98B661AC85E1}" type="datetimeFigureOut">
               <a:rPr lang="en-US" smtClean="0"/>
-              <a:t>3/27/2014</a:t>
+              <a:t>3/30/14</a:t>
             </a:fld>
             <a:endParaRPr lang="en-US"/>
           </a:p>
@@ -458,7 +458,7 @@
           <a:p>
             <a:fld id="{13F24B86-36D2-4655-BE2F-98B661AC85E1}" type="datetimeFigureOut">
               <a:rPr lang="en-US" smtClean="0"/>
-              <a:t>3/27/2014</a:t>
+              <a:t>3/30/14</a:t>
             </a:fld>
             <a:endParaRPr lang="en-US"/>
           </a:p>
@@ -638,7 +638,7 @@
           <a:p>
             <a:fld id="{13F24B86-36D2-4655-BE2F-98B661AC85E1}" type="datetimeFigureOut">
               <a:rPr lang="en-US" smtClean="0"/>
-              <a:t>3/27/2014</a:t>
+              <a:t>3/30/14</a:t>
             </a:fld>
             <a:endParaRPr lang="en-US"/>
           </a:p>
@@ -808,7 +808,7 @@
           <a:p>
             <a:fld id="{13F24B86-36D2-4655-BE2F-98B661AC85E1}" type="datetimeFigureOut">
               <a:rPr lang="en-US" smtClean="0"/>
-              <a:t>3/27/2014</a:t>
+              <a:t>3/30/14</a:t>
             </a:fld>
             <a:endParaRPr lang="en-US"/>
           </a:p>
@@ -1054,7 +1054,7 @@
           <a:p>
             <a:fld id="{13F24B86-36D2-4655-BE2F-98B661AC85E1}" type="datetimeFigureOut">
               <a:rPr lang="en-US" smtClean="0"/>
-              <a:t>3/27/2014</a:t>
+              <a:t>3/30/14</a:t>
             </a:fld>
             <a:endParaRPr lang="en-US"/>
           </a:p>
@@ -1342,7 +1342,7 @@
           <a:p>
             <a:fld id="{13F24B86-36D2-4655-BE2F-98B661AC85E1}" type="datetimeFigureOut">
               <a:rPr lang="en-US" smtClean="0"/>
-              <a:t>3/27/2014</a:t>
+              <a:t>3/30/14</a:t>
             </a:fld>
             <a:endParaRPr lang="en-US"/>
           </a:p>
@@ -1764,7 +1764,7 @@
           <a:p>
             <a:fld id="{13F24B86-36D2-4655-BE2F-98B661AC85E1}" type="datetimeFigureOut">
               <a:rPr lang="en-US" smtClean="0"/>
-              <a:t>3/27/2014</a:t>
+              <a:t>3/30/14</a:t>
             </a:fld>
             <a:endParaRPr lang="en-US"/>
           </a:p>
@@ -1882,7 +1882,7 @@
           <a:p>
             <a:fld id="{13F24B86-36D2-4655-BE2F-98B661AC85E1}" type="datetimeFigureOut">
               <a:rPr lang="en-US" smtClean="0"/>
-              <a:t>3/27/2014</a:t>
+              <a:t>3/30/14</a:t>
             </a:fld>
             <a:endParaRPr lang="en-US"/>
           </a:p>
@@ -1977,7 +1977,7 @@
           <a:p>
             <a:fld id="{13F24B86-36D2-4655-BE2F-98B661AC85E1}" type="datetimeFigureOut">
               <a:rPr lang="en-US" smtClean="0"/>
-              <a:t>3/27/2014</a:t>
+              <a:t>3/30/14</a:t>
             </a:fld>
             <a:endParaRPr lang="en-US"/>
           </a:p>
@@ -2254,7 +2254,7 @@
           <a:p>
             <a:fld id="{13F24B86-36D2-4655-BE2F-98B661AC85E1}" type="datetimeFigureOut">
               <a:rPr lang="en-US" smtClean="0"/>
-              <a:t>3/27/2014</a:t>
+              <a:t>3/30/14</a:t>
             </a:fld>
             <a:endParaRPr lang="en-US"/>
           </a:p>
@@ -2507,7 +2507,7 @@
           <a:p>
             <a:fld id="{13F24B86-36D2-4655-BE2F-98B661AC85E1}" type="datetimeFigureOut">
               <a:rPr lang="en-US" smtClean="0"/>
-              <a:t>3/27/2014</a:t>
+              <a:t>3/30/14</a:t>
             </a:fld>
             <a:endParaRPr lang="en-US"/>
           </a:p>
@@ -2720,7 +2720,7 @@
           <a:p>
             <a:fld id="{13F24B86-36D2-4655-BE2F-98B661AC85E1}" type="datetimeFigureOut">
               <a:rPr lang="en-US" smtClean="0"/>
-              <a:t>3/27/2014</a:t>
+              <a:t>3/30/14</a:t>
             </a:fld>
             <a:endParaRPr lang="en-US"/>
           </a:p>
@@ -3104,7 +3104,7 @@
           <p:nvPr>
             <p:extLst>
               <p:ext uri="{D42A27DB-BD31-4B8C-83A1-F6EECF244321}">
-                <p14:modId xmlns:p14="http://schemas.microsoft.com/office/powerpoint/2010/main" val="2252262906"/>
+                <p14:modId xmlns:p14="http://schemas.microsoft.com/office/powerpoint/2010/main" val="941963398"/>
               </p:ext>
             </p:extLst>
           </p:nvPr>
@@ -4663,14 +4663,14 @@
           <p:nvPr>
             <p:extLst>
               <p:ext uri="{D42A27DB-BD31-4B8C-83A1-F6EECF244321}">
-                <p14:modId xmlns:p14="http://schemas.microsoft.com/office/powerpoint/2010/main" val="4037736104"/>
+                <p14:modId xmlns:p14="http://schemas.microsoft.com/office/powerpoint/2010/main" val="1913259055"/>
               </p:ext>
             </p:extLst>
           </p:nvPr>
         </p:nvGraphicFramePr>
         <p:xfrm>
           <a:off x="5727564" y="1676381"/>
-          <a:ext cx="4426492" cy="2225040"/>
+          <a:ext cx="4426492" cy="2057400"/>
         </p:xfrm>
         <a:graphic>
           <a:graphicData uri="http://schemas.openxmlformats.org/drawingml/2006/table">
@@ -4913,8 +4913,9 @@
                     <a:p>
                       <a:r>
                         <a:rPr lang="en-US" sz="1100" dirty="0" smtClean="0"/>
-                        <a:t>Adversary Bravo Phishing</a:t>
+                        <a:t>Phishing</a:t>
                       </a:r>
+                      <a:endParaRPr lang="en-US" sz="1100" dirty="0" smtClean="0"/>
                     </a:p>
                   </a:txBody>
                   <a:tcPr>
@@ -5280,15 +5281,7 @@
                             <a:schemeClr val="tx1"/>
                           </a:solidFill>
                         </a:rPr>
-                        <a:t>Adversary Bravo’s primary</a:t>
-                      </a:r>
-                      <a:r>
-                        <a:rPr lang="en-US" sz="1100" b="0" baseline="0" dirty="0" smtClean="0">
-                          <a:solidFill>
-                            <a:schemeClr val="tx1"/>
-                          </a:solidFill>
-                        </a:rPr>
-                        <a:t> malware deliver mechanism is through untargeted phishing.</a:t>
+                        <a:t>Phishing</a:t>
                       </a:r>
                       <a:endParaRPr lang="en-US" sz="1100" b="0" dirty="0" smtClean="0">
                         <a:solidFill>
@@ -5356,7 +5349,7 @@
           <p:nvPr>
             <p:extLst>
               <p:ext uri="{D42A27DB-BD31-4B8C-83A1-F6EECF244321}">
-                <p14:modId xmlns:p14="http://schemas.microsoft.com/office/powerpoint/2010/main" val="1325150823"/>
+                <p14:modId xmlns:p14="http://schemas.microsoft.com/office/powerpoint/2010/main" val="1830423019"/>
               </p:ext>
             </p:extLst>
           </p:nvPr>
@@ -5626,9 +5619,18 @@
                     <a:lstStyle/>
                     <a:p>
                       <a:r>
-                        <a:rPr lang="en-US" sz="1100" dirty="0" smtClean="0"/>
-                        <a:t>Adversary Bravo PIVY Instance</a:t>
+                        <a:rPr lang="en-US" sz="1100" b="0" dirty="0" smtClean="0">
+                          <a:solidFill>
+                            <a:schemeClr val="tx1"/>
+                          </a:solidFill>
+                        </a:rPr>
+                        <a:t>Poison Ivy Variant d1c6</a:t>
                       </a:r>
+                      <a:endParaRPr lang="en-US" sz="1100" b="0" dirty="0" smtClean="0">
+                        <a:solidFill>
+                          <a:schemeClr val="tx1"/>
+                        </a:solidFill>
+                      </a:endParaRPr>
                     </a:p>
                   </a:txBody>
                   <a:tcPr>

</xml_diff>